<commit_message>
Update presentation and notebook
</commit_message>
<xml_diff>
--- a/Presentation/Streaming Demo.pptx
+++ b/Presentation/Streaming Demo.pptx
@@ -911,6 +911,76 @@
     </pc:docChg>
   </pc:docChgLst>
   <pc:docChgLst>
+    <pc:chgData name="Leigh Farah" userId="S::lefarah@microsoft.com::f47b0a69-33f2-4dca-a304-52ebe0b9e412" providerId="AD" clId="Web-{7B354717-FDC1-4391-B433-A221FB0659FB}"/>
+    <pc:docChg chg="modSld">
+      <pc:chgData name="Leigh Farah" userId="S::lefarah@microsoft.com::f47b0a69-33f2-4dca-a304-52ebe0b9e412" providerId="AD" clId="Web-{7B354717-FDC1-4391-B433-A221FB0659FB}" dt="2020-01-23T16:52:07.690" v="327" actId="20577"/>
+      <pc:docMkLst>
+        <pc:docMk/>
+      </pc:docMkLst>
+      <pc:sldChg chg="modSp">
+        <pc:chgData name="Leigh Farah" userId="S::lefarah@microsoft.com::f47b0a69-33f2-4dca-a304-52ebe0b9e412" providerId="AD" clId="Web-{7B354717-FDC1-4391-B433-A221FB0659FB}" dt="2020-01-23T16:51:50.831" v="320"/>
+        <pc:sldMkLst>
+          <pc:docMk/>
+          <pc:sldMk cId="3957722359" sldId="1660"/>
+        </pc:sldMkLst>
+        <pc:graphicFrameChg chg="mod modGraphic">
+          <ac:chgData name="Leigh Farah" userId="S::lefarah@microsoft.com::f47b0a69-33f2-4dca-a304-52ebe0b9e412" providerId="AD" clId="Web-{7B354717-FDC1-4391-B433-A221FB0659FB}" dt="2020-01-23T16:51:50.831" v="320"/>
+          <ac:graphicFrameMkLst>
+            <pc:docMk/>
+            <pc:sldMk cId="3957722359" sldId="1660"/>
+            <ac:graphicFrameMk id="2" creationId="{93237723-2717-443B-89DD-9CEE30B63649}"/>
+          </ac:graphicFrameMkLst>
+        </pc:graphicFrameChg>
+      </pc:sldChg>
+      <pc:sldChg chg="delSp modSp">
+        <pc:chgData name="Leigh Farah" userId="S::lefarah@microsoft.com::f47b0a69-33f2-4dca-a304-52ebe0b9e412" providerId="AD" clId="Web-{7B354717-FDC1-4391-B433-A221FB0659FB}" dt="2020-01-23T16:51:13.816" v="261"/>
+        <pc:sldMkLst>
+          <pc:docMk/>
+          <pc:sldMk cId="2327508477" sldId="1907"/>
+        </pc:sldMkLst>
+        <pc:spChg chg="del">
+          <ac:chgData name="Leigh Farah" userId="S::lefarah@microsoft.com::f47b0a69-33f2-4dca-a304-52ebe0b9e412" providerId="AD" clId="Web-{7B354717-FDC1-4391-B433-A221FB0659FB}" dt="2020-01-23T16:16:44.673" v="0"/>
+          <ac:spMkLst>
+            <pc:docMk/>
+            <pc:sldMk cId="2327508477" sldId="1907"/>
+            <ac:spMk id="3" creationId="{F5C07BE1-5051-441C-8FB0-1B75C4C8D5C7}"/>
+          </ac:spMkLst>
+        </pc:spChg>
+        <pc:graphicFrameChg chg="mod modGraphic">
+          <ac:chgData name="Leigh Farah" userId="S::lefarah@microsoft.com::f47b0a69-33f2-4dca-a304-52ebe0b9e412" providerId="AD" clId="Web-{7B354717-FDC1-4391-B433-A221FB0659FB}" dt="2020-01-23T16:51:13.816" v="261"/>
+          <ac:graphicFrameMkLst>
+            <pc:docMk/>
+            <pc:sldMk cId="2327508477" sldId="1907"/>
+            <ac:graphicFrameMk id="4" creationId="{591D02F6-1134-4EAC-A21B-F0DBB49004E5}"/>
+          </ac:graphicFrameMkLst>
+        </pc:graphicFrameChg>
+      </pc:sldChg>
+      <pc:sldChg chg="delSp modSp">
+        <pc:chgData name="Leigh Farah" userId="S::lefarah@microsoft.com::f47b0a69-33f2-4dca-a304-52ebe0b9e412" providerId="AD" clId="Web-{7B354717-FDC1-4391-B433-A221FB0659FB}" dt="2020-01-23T16:52:06.565" v="326" actId="20577"/>
+        <pc:sldMkLst>
+          <pc:docMk/>
+          <pc:sldMk cId="1983851541" sldId="1909"/>
+        </pc:sldMkLst>
+        <pc:spChg chg="mod">
+          <ac:chgData name="Leigh Farah" userId="S::lefarah@microsoft.com::f47b0a69-33f2-4dca-a304-52ebe0b9e412" providerId="AD" clId="Web-{7B354717-FDC1-4391-B433-A221FB0659FB}" dt="2020-01-23T16:52:06.565" v="326" actId="20577"/>
+          <ac:spMkLst>
+            <pc:docMk/>
+            <pc:sldMk cId="1983851541" sldId="1909"/>
+            <ac:spMk id="2" creationId="{40A67012-A26D-4EE2-A5D3-B5E8C8514E7C}"/>
+          </ac:spMkLst>
+        </pc:spChg>
+        <pc:spChg chg="del">
+          <ac:chgData name="Leigh Farah" userId="S::lefarah@microsoft.com::f47b0a69-33f2-4dca-a304-52ebe0b9e412" providerId="AD" clId="Web-{7B354717-FDC1-4391-B433-A221FB0659FB}" dt="2020-01-23T16:16:53.470" v="1"/>
+          <ac:spMkLst>
+            <pc:docMk/>
+            <pc:sldMk cId="1983851541" sldId="1909"/>
+            <ac:spMk id="3" creationId="{F5C07BE1-5051-441C-8FB0-1B75C4C8D5C7}"/>
+          </ac:spMkLst>
+        </pc:spChg>
+      </pc:sldChg>
+    </pc:docChg>
+  </pc:docChgLst>
+  <pc:docChgLst>
     <pc:chgData name="Howard Ginsburg" userId="73a0707f-ca64-421c-90b3-47712658ea9d" providerId="ADAL" clId="{B834B3B4-5745-4036-80EC-6C8AF911B1BE}"/>
     <pc:docChg chg="custSel mod addSld delSld modSld sldOrd modSection">
       <pc:chgData name="Howard Ginsburg" userId="73a0707f-ca64-421c-90b3-47712658ea9d" providerId="ADAL" clId="{B834B3B4-5745-4036-80EC-6C8AF911B1BE}" dt="2020-01-23T03:13:05.402" v="792" actId="47"/>
@@ -1275,76 +1345,6 @@
       </pc:sldChg>
     </pc:docChg>
   </pc:docChgLst>
-  <pc:docChgLst>
-    <pc:chgData name="Leigh Farah" userId="S::lefarah@microsoft.com::f47b0a69-33f2-4dca-a304-52ebe0b9e412" providerId="AD" clId="Web-{7B354717-FDC1-4391-B433-A221FB0659FB}"/>
-    <pc:docChg chg="modSld">
-      <pc:chgData name="Leigh Farah" userId="S::lefarah@microsoft.com::f47b0a69-33f2-4dca-a304-52ebe0b9e412" providerId="AD" clId="Web-{7B354717-FDC1-4391-B433-A221FB0659FB}" dt="2020-01-23T16:52:07.690" v="327" actId="20577"/>
-      <pc:docMkLst>
-        <pc:docMk/>
-      </pc:docMkLst>
-      <pc:sldChg chg="modSp">
-        <pc:chgData name="Leigh Farah" userId="S::lefarah@microsoft.com::f47b0a69-33f2-4dca-a304-52ebe0b9e412" providerId="AD" clId="Web-{7B354717-FDC1-4391-B433-A221FB0659FB}" dt="2020-01-23T16:51:50.831" v="320"/>
-        <pc:sldMkLst>
-          <pc:docMk/>
-          <pc:sldMk cId="3957722359" sldId="1660"/>
-        </pc:sldMkLst>
-        <pc:graphicFrameChg chg="mod modGraphic">
-          <ac:chgData name="Leigh Farah" userId="S::lefarah@microsoft.com::f47b0a69-33f2-4dca-a304-52ebe0b9e412" providerId="AD" clId="Web-{7B354717-FDC1-4391-B433-A221FB0659FB}" dt="2020-01-23T16:51:50.831" v="320"/>
-          <ac:graphicFrameMkLst>
-            <pc:docMk/>
-            <pc:sldMk cId="3957722359" sldId="1660"/>
-            <ac:graphicFrameMk id="2" creationId="{93237723-2717-443B-89DD-9CEE30B63649}"/>
-          </ac:graphicFrameMkLst>
-        </pc:graphicFrameChg>
-      </pc:sldChg>
-      <pc:sldChg chg="delSp modSp">
-        <pc:chgData name="Leigh Farah" userId="S::lefarah@microsoft.com::f47b0a69-33f2-4dca-a304-52ebe0b9e412" providerId="AD" clId="Web-{7B354717-FDC1-4391-B433-A221FB0659FB}" dt="2020-01-23T16:51:13.816" v="261"/>
-        <pc:sldMkLst>
-          <pc:docMk/>
-          <pc:sldMk cId="2327508477" sldId="1907"/>
-        </pc:sldMkLst>
-        <pc:spChg chg="del">
-          <ac:chgData name="Leigh Farah" userId="S::lefarah@microsoft.com::f47b0a69-33f2-4dca-a304-52ebe0b9e412" providerId="AD" clId="Web-{7B354717-FDC1-4391-B433-A221FB0659FB}" dt="2020-01-23T16:16:44.673" v="0"/>
-          <ac:spMkLst>
-            <pc:docMk/>
-            <pc:sldMk cId="2327508477" sldId="1907"/>
-            <ac:spMk id="3" creationId="{F5C07BE1-5051-441C-8FB0-1B75C4C8D5C7}"/>
-          </ac:spMkLst>
-        </pc:spChg>
-        <pc:graphicFrameChg chg="mod modGraphic">
-          <ac:chgData name="Leigh Farah" userId="S::lefarah@microsoft.com::f47b0a69-33f2-4dca-a304-52ebe0b9e412" providerId="AD" clId="Web-{7B354717-FDC1-4391-B433-A221FB0659FB}" dt="2020-01-23T16:51:13.816" v="261"/>
-          <ac:graphicFrameMkLst>
-            <pc:docMk/>
-            <pc:sldMk cId="2327508477" sldId="1907"/>
-            <ac:graphicFrameMk id="4" creationId="{591D02F6-1134-4EAC-A21B-F0DBB49004E5}"/>
-          </ac:graphicFrameMkLst>
-        </pc:graphicFrameChg>
-      </pc:sldChg>
-      <pc:sldChg chg="delSp modSp">
-        <pc:chgData name="Leigh Farah" userId="S::lefarah@microsoft.com::f47b0a69-33f2-4dca-a304-52ebe0b9e412" providerId="AD" clId="Web-{7B354717-FDC1-4391-B433-A221FB0659FB}" dt="2020-01-23T16:52:06.565" v="326" actId="20577"/>
-        <pc:sldMkLst>
-          <pc:docMk/>
-          <pc:sldMk cId="1983851541" sldId="1909"/>
-        </pc:sldMkLst>
-        <pc:spChg chg="mod">
-          <ac:chgData name="Leigh Farah" userId="S::lefarah@microsoft.com::f47b0a69-33f2-4dca-a304-52ebe0b9e412" providerId="AD" clId="Web-{7B354717-FDC1-4391-B433-A221FB0659FB}" dt="2020-01-23T16:52:06.565" v="326" actId="20577"/>
-          <ac:spMkLst>
-            <pc:docMk/>
-            <pc:sldMk cId="1983851541" sldId="1909"/>
-            <ac:spMk id="2" creationId="{40A67012-A26D-4EE2-A5D3-B5E8C8514E7C}"/>
-          </ac:spMkLst>
-        </pc:spChg>
-        <pc:spChg chg="del">
-          <ac:chgData name="Leigh Farah" userId="S::lefarah@microsoft.com::f47b0a69-33f2-4dca-a304-52ebe0b9e412" providerId="AD" clId="Web-{7B354717-FDC1-4391-B433-A221FB0659FB}" dt="2020-01-23T16:16:53.470" v="1"/>
-          <ac:spMkLst>
-            <pc:docMk/>
-            <pc:sldMk cId="1983851541" sldId="1909"/>
-            <ac:spMk id="3" creationId="{F5C07BE1-5051-441C-8FB0-1B75C4C8D5C7}"/>
-          </ac:spMkLst>
-        </pc:spChg>
-      </pc:sldChg>
-    </pc:docChg>
-  </pc:docChgLst>
 </pc:chgInfo>
 </file>
 
@@ -1434,7 +1434,7 @@
               <a:rPr lang="en-US" smtClean="0">
                 <a:latin typeface="Segoe UI" pitchFamily="34" charset="0"/>
               </a:rPr>
-              <a:t>5/13/2020 10:56 AM</a:t>
+              <a:t>5/18/2020 4:07 PM</a:t>
             </a:fld>
             <a:endParaRPr lang="en-US">
               <a:latin typeface="Segoe UI" pitchFamily="34" charset="0"/>
@@ -1712,7 +1712,7 @@
           <a:p>
             <a:fld id="{386CE63F-9E7F-4C04-9D0D-FCA25A8E9E86}" type="datetime8">
               <a:rPr lang="en-US" smtClean="0"/>
-              <a:t>5/13/2020 10:56 AM</a:t>
+              <a:t>5/18/2020 4:07 PM</a:t>
             </a:fld>
             <a:endParaRPr lang="en-US"/>
           </a:p>
@@ -2079,7 +2079,7 @@
           <a:p>
             <a:fld id="{386CE63F-9E7F-4C04-9D0D-FCA25A8E9E86}" type="datetime8">
               <a:rPr lang="en-US" smtClean="0"/>
-              <a:t>5/13/2020 10:56 AM</a:t>
+              <a:t>5/18/2020 4:07 PM</a:t>
             </a:fld>
             <a:endParaRPr lang="en-US"/>
           </a:p>
@@ -2244,7 +2244,7 @@
           <a:p>
             <a:fld id="{386CE63F-9E7F-4C04-9D0D-FCA25A8E9E86}" type="datetime8">
               <a:rPr lang="en-US" smtClean="0"/>
-              <a:t>5/13/2020 11:42 AM</a:t>
+              <a:t>5/18/2020 4:07 PM</a:t>
             </a:fld>
             <a:endParaRPr lang="en-US"/>
           </a:p>
@@ -2394,7 +2394,7 @@
                   <a:prstClr val="black"/>
                 </a:solidFill>
               </a:rPr>
-              <a:t>5/13/2020 10:56 AM</a:t>
+              <a:t>5/18/2020 4:07 PM</a:t>
             </a:fld>
             <a:endParaRPr lang="en-US">
               <a:solidFill>
@@ -15790,13 +15790,13 @@
   <p:clrMapOvr>
     <a:overrideClrMapping bg1="dk1" tx1="lt1" bg2="dk2" tx2="lt2" accent1="accent1" accent2="accent2" accent3="accent3" accent4="accent4" accent5="accent5" accent6="accent6" hlink="hlink" folHlink="folHlink"/>
   </p:clrMapOvr>
-  <mc:AlternateContent xmlns:mc="http://schemas.openxmlformats.org/markup-compatibility/2006">
-    <mc:Choice xmlns:p14="http://schemas.microsoft.com/office/powerpoint/2010/main" Requires="p14">
+  <mc:AlternateContent xmlns:mc="http://schemas.openxmlformats.org/markup-compatibility/2006" xmlns:p14="http://schemas.microsoft.com/office/powerpoint/2010/main">
+    <mc:Choice Requires="p14">
       <p:transition spd="med" p14:dur="700">
         <p:fade/>
       </p:transition>
     </mc:Choice>
-    <mc:Fallback>
+    <mc:Fallback xmlns="">
       <p:transition spd="med">
         <p:fade/>
       </p:transition>
@@ -16019,13 +16019,13 @@
   <p:clrMapOvr>
     <a:overrideClrMapping bg1="lt1" tx1="dk1" bg2="lt2" tx2="dk2" accent1="accent1" accent2="accent2" accent3="accent3" accent4="accent4" accent5="accent5" accent6="accent6" hlink="hlink" folHlink="folHlink"/>
   </p:clrMapOvr>
-  <mc:AlternateContent xmlns:mc="http://schemas.openxmlformats.org/markup-compatibility/2006">
-    <mc:Choice xmlns:p14="http://schemas.microsoft.com/office/powerpoint/2010/main" Requires="p14">
+  <mc:AlternateContent xmlns:mc="http://schemas.openxmlformats.org/markup-compatibility/2006" xmlns:p14="http://schemas.microsoft.com/office/powerpoint/2010/main">
+    <mc:Choice Requires="p14">
       <p:transition spd="med" p14:dur="700">
         <p:fade/>
       </p:transition>
     </mc:Choice>
-    <mc:Fallback>
+    <mc:Fallback xmlns="">
       <p:transition spd="med">
         <p:fade/>
       </p:transition>
@@ -16231,13 +16231,13 @@
   <p:clrMapOvr>
     <a:overrideClrMapping bg1="dk1" tx1="lt1" bg2="dk2" tx2="lt2" accent1="accent1" accent2="accent2" accent3="accent3" accent4="accent4" accent5="accent5" accent6="accent6" hlink="hlink" folHlink="folHlink"/>
   </p:clrMapOvr>
-  <mc:AlternateContent xmlns:mc="http://schemas.openxmlformats.org/markup-compatibility/2006">
-    <mc:Choice xmlns:p14="http://schemas.microsoft.com/office/powerpoint/2010/main" Requires="p14">
+  <mc:AlternateContent xmlns:mc="http://schemas.openxmlformats.org/markup-compatibility/2006" xmlns:p14="http://schemas.microsoft.com/office/powerpoint/2010/main">
+    <mc:Choice Requires="p14">
       <p:transition spd="med" p14:dur="700">
         <p:fade/>
       </p:transition>
     </mc:Choice>
-    <mc:Fallback>
+    <mc:Fallback xmlns="">
       <p:transition spd="med">
         <p:fade/>
       </p:transition>
@@ -16435,13 +16435,13 @@
   <p:clrMapOvr>
     <a:overrideClrMapping bg1="lt1" tx1="dk1" bg2="lt2" tx2="dk2" accent1="accent1" accent2="accent2" accent3="accent3" accent4="accent4" accent5="accent5" accent6="accent6" hlink="hlink" folHlink="folHlink"/>
   </p:clrMapOvr>
-  <mc:AlternateContent xmlns:mc="http://schemas.openxmlformats.org/markup-compatibility/2006">
-    <mc:Choice xmlns:p14="http://schemas.microsoft.com/office/powerpoint/2010/main" Requires="p14">
+  <mc:AlternateContent xmlns:mc="http://schemas.openxmlformats.org/markup-compatibility/2006" xmlns:p14="http://schemas.microsoft.com/office/powerpoint/2010/main">
+    <mc:Choice Requires="p14">
       <p:transition spd="med" p14:dur="700">
         <p:fade/>
       </p:transition>
     </mc:Choice>
-    <mc:Fallback>
+    <mc:Fallback xmlns="">
       <p:transition spd="med">
         <p:fade/>
       </p:transition>
@@ -18748,13 +18748,13 @@
   <p:clrMapOvr>
     <a:overrideClrMapping bg1="dk1" tx1="lt1" bg2="dk2" tx2="lt2" accent1="accent1" accent2="accent2" accent3="accent3" accent4="accent4" accent5="accent5" accent6="accent6" hlink="hlink" folHlink="folHlink"/>
   </p:clrMapOvr>
-  <mc:AlternateContent xmlns:mc="http://schemas.openxmlformats.org/markup-compatibility/2006">
-    <mc:Choice xmlns:p14="http://schemas.microsoft.com/office/powerpoint/2010/main" Requires="p14">
+  <mc:AlternateContent xmlns:mc="http://schemas.openxmlformats.org/markup-compatibility/2006" xmlns:p14="http://schemas.microsoft.com/office/powerpoint/2010/main">
+    <mc:Choice Requires="p14">
       <p:transition spd="med" p14:dur="700">
         <p:fade/>
       </p:transition>
     </mc:Choice>
-    <mc:Fallback>
+    <mc:Fallback xmlns="">
       <p:transition spd="med">
         <p:fade/>
       </p:transition>
@@ -19220,13 +19220,13 @@
   <p:clrMapOvr>
     <a:overrideClrMapping bg1="lt1" tx1="dk1" bg2="lt2" tx2="dk2" accent1="accent1" accent2="accent2" accent3="accent3" accent4="accent4" accent5="accent5" accent6="accent6" hlink="hlink" folHlink="folHlink"/>
   </p:clrMapOvr>
-  <mc:AlternateContent xmlns:mc="http://schemas.openxmlformats.org/markup-compatibility/2006">
-    <mc:Choice xmlns:p14="http://schemas.microsoft.com/office/powerpoint/2010/main" Requires="p14">
+  <mc:AlternateContent xmlns:mc="http://schemas.openxmlformats.org/markup-compatibility/2006" xmlns:p14="http://schemas.microsoft.com/office/powerpoint/2010/main">
+    <mc:Choice Requires="p14">
       <p:transition spd="med" p14:dur="700">
         <p:fade/>
       </p:transition>
     </mc:Choice>
-    <mc:Fallback>
+    <mc:Fallback xmlns="">
       <p:transition spd="med">
         <p:fade/>
       </p:transition>
@@ -19353,13 +19353,13 @@
   <p:clrMapOvr>
     <a:overrideClrMapping bg1="dk1" tx1="lt1" bg2="dk2" tx2="lt2" accent1="accent1" accent2="accent2" accent3="accent3" accent4="accent4" accent5="accent5" accent6="accent6" hlink="hlink" folHlink="folHlink"/>
   </p:clrMapOvr>
-  <mc:AlternateContent xmlns:mc="http://schemas.openxmlformats.org/markup-compatibility/2006">
-    <mc:Choice xmlns:p14="http://schemas.microsoft.com/office/powerpoint/2010/main" Requires="p14">
+  <mc:AlternateContent xmlns:mc="http://schemas.openxmlformats.org/markup-compatibility/2006" xmlns:p14="http://schemas.microsoft.com/office/powerpoint/2010/main">
+    <mc:Choice Requires="p14">
       <p:transition spd="med" p14:dur="700">
         <p:fade/>
       </p:transition>
     </mc:Choice>
-    <mc:Fallback>
+    <mc:Fallback xmlns="">
       <p:transition spd="med">
         <p:fade/>
       </p:transition>
@@ -19486,13 +19486,13 @@
   <p:clrMapOvr>
     <a:overrideClrMapping bg1="lt1" tx1="dk1" bg2="lt2" tx2="dk2" accent1="accent1" accent2="accent2" accent3="accent3" accent4="accent4" accent5="accent5" accent6="accent6" hlink="hlink" folHlink="folHlink"/>
   </p:clrMapOvr>
-  <mc:AlternateContent xmlns:mc="http://schemas.openxmlformats.org/markup-compatibility/2006">
-    <mc:Choice xmlns:p14="http://schemas.microsoft.com/office/powerpoint/2010/main" Requires="p14">
+  <mc:AlternateContent xmlns:mc="http://schemas.openxmlformats.org/markup-compatibility/2006" xmlns:p14="http://schemas.microsoft.com/office/powerpoint/2010/main">
+    <mc:Choice Requires="p14">
       <p:transition spd="med" p14:dur="700">
         <p:fade/>
       </p:transition>
     </mc:Choice>
-    <mc:Fallback>
+    <mc:Fallback xmlns="">
       <p:transition spd="med">
         <p:fade/>
       </p:transition>
@@ -19619,13 +19619,13 @@
   <p:clrMapOvr>
     <a:overrideClrMapping bg1="dk1" tx1="lt1" bg2="dk2" tx2="lt2" accent1="accent1" accent2="accent2" accent3="accent3" accent4="accent4" accent5="accent5" accent6="accent6" hlink="hlink" folHlink="folHlink"/>
   </p:clrMapOvr>
-  <mc:AlternateContent xmlns:mc="http://schemas.openxmlformats.org/markup-compatibility/2006">
-    <mc:Choice xmlns:p14="http://schemas.microsoft.com/office/powerpoint/2010/main" Requires="p14">
+  <mc:AlternateContent xmlns:mc="http://schemas.openxmlformats.org/markup-compatibility/2006" xmlns:p14="http://schemas.microsoft.com/office/powerpoint/2010/main">
+    <mc:Choice Requires="p14">
       <p:transition spd="med" p14:dur="700">
         <p:fade/>
       </p:transition>
     </mc:Choice>
-    <mc:Fallback>
+    <mc:Fallback xmlns="">
       <p:transition spd="med">
         <p:fade/>
       </p:transition>
@@ -19752,13 +19752,13 @@
   <p:clrMapOvr>
     <a:overrideClrMapping bg1="lt1" tx1="dk1" bg2="lt2" tx2="dk2" accent1="accent1" accent2="accent2" accent3="accent3" accent4="accent4" accent5="accent5" accent6="accent6" hlink="hlink" folHlink="folHlink"/>
   </p:clrMapOvr>
-  <mc:AlternateContent xmlns:mc="http://schemas.openxmlformats.org/markup-compatibility/2006">
-    <mc:Choice xmlns:p14="http://schemas.microsoft.com/office/powerpoint/2010/main" Requires="p14">
+  <mc:AlternateContent xmlns:mc="http://schemas.openxmlformats.org/markup-compatibility/2006" xmlns:p14="http://schemas.microsoft.com/office/powerpoint/2010/main">
+    <mc:Choice Requires="p14">
       <p:transition spd="med" p14:dur="700">
         <p:fade/>
       </p:transition>
     </mc:Choice>
-    <mc:Fallback>
+    <mc:Fallback xmlns="">
       <p:transition spd="med">
         <p:fade/>
       </p:transition>
@@ -27687,7 +27687,7 @@
         <p:spPr>
           <a:xfrm>
             <a:off x="582042" y="4161395"/>
-            <a:ext cx="4164583" cy="1819275"/>
+            <a:ext cx="4164583" cy="2554545"/>
           </a:xfrm>
         </p:spPr>
         <p:txBody>
@@ -27717,7 +27717,7 @@
           <a:p>
             <a:r>
               <a:rPr lang="en-US" dirty="0"/>
-              <a:t>May 11, 2020</a:t>
+              <a:t>May 18, 2020</a:t>
             </a:r>
           </a:p>
           <a:p>
@@ -29527,6 +29527,44 @@
           <a:chExt cx="0" cy="0"/>
         </a:xfrm>
       </p:grpSpPr>
+      <p:sp>
+        <p:nvSpPr>
+          <p:cNvPr id="3" name="TextBox 2">
+            <a:extLst>
+              <a:ext uri="{FF2B5EF4-FFF2-40B4-BE49-F238E27FC236}">
+                <a16:creationId xmlns:a16="http://schemas.microsoft.com/office/drawing/2014/main" id="{1A6632C0-C0C0-4593-A9E0-C79AD24727DB}"/>
+              </a:ext>
+            </a:extLst>
+          </p:cNvPr>
+          <p:cNvSpPr txBox="1"/>
+          <p:nvPr/>
+        </p:nvSpPr>
+        <p:spPr>
+          <a:xfrm>
+            <a:off x="328048" y="1999414"/>
+            <a:ext cx="11863952" cy="769441"/>
+          </a:xfrm>
+          <a:prstGeom prst="rect">
+            <a:avLst/>
+          </a:prstGeom>
+          <a:noFill/>
+        </p:spPr>
+        <p:txBody>
+          <a:bodyPr wrap="square">
+            <a:spAutoFit/>
+          </a:bodyPr>
+          <a:lstStyle/>
+          <a:p>
+            <a:r>
+              <a:rPr lang="en-US" sz="4400" dirty="0">
+                <a:hlinkClick r:id="rId3"/>
+              </a:rPr>
+              <a:t>https://github.com/GLRAzure/streaming-demo</a:t>
+            </a:r>
+            <a:endParaRPr lang="en-US" sz="4400" dirty="0"/>
+          </a:p>
+        </p:txBody>
+      </p:sp>
     </p:spTree>
     <p:extLst>
       <p:ext uri="{BB962C8B-B14F-4D97-AF65-F5344CB8AC3E}">

</xml_diff>